<commit_message>
Versión draft del poster
</commit_message>
<xml_diff>
--- a/Poster.pptx
+++ b/Poster.pptx
@@ -261,7 +261,7 @@
           <a:p>
             <a:fld id="{1B191391-6197-4AE5-88CF-40C5D3F13529}" type="datetimeFigureOut">
               <a:rPr lang="es-PY" smtClean="0"/>
-              <a:t>27/4/2023</a:t>
+              <a:t>2/5/2023</a:t>
             </a:fld>
             <a:endParaRPr lang="es-PY"/>
           </a:p>
@@ -461,7 +461,7 @@
           <a:p>
             <a:fld id="{1B191391-6197-4AE5-88CF-40C5D3F13529}" type="datetimeFigureOut">
               <a:rPr lang="es-PY" smtClean="0"/>
-              <a:t>27/4/2023</a:t>
+              <a:t>2/5/2023</a:t>
             </a:fld>
             <a:endParaRPr lang="es-PY"/>
           </a:p>
@@ -671,7 +671,7 @@
           <a:p>
             <a:fld id="{1B191391-6197-4AE5-88CF-40C5D3F13529}" type="datetimeFigureOut">
               <a:rPr lang="es-PY" smtClean="0"/>
-              <a:t>27/4/2023</a:t>
+              <a:t>2/5/2023</a:t>
             </a:fld>
             <a:endParaRPr lang="es-PY"/>
           </a:p>
@@ -871,7 +871,7 @@
           <a:p>
             <a:fld id="{1B191391-6197-4AE5-88CF-40C5D3F13529}" type="datetimeFigureOut">
               <a:rPr lang="es-PY" smtClean="0"/>
-              <a:t>27/4/2023</a:t>
+              <a:t>2/5/2023</a:t>
             </a:fld>
             <a:endParaRPr lang="es-PY"/>
           </a:p>
@@ -1147,7 +1147,7 @@
           <a:p>
             <a:fld id="{1B191391-6197-4AE5-88CF-40C5D3F13529}" type="datetimeFigureOut">
               <a:rPr lang="es-PY" smtClean="0"/>
-              <a:t>27/4/2023</a:t>
+              <a:t>2/5/2023</a:t>
             </a:fld>
             <a:endParaRPr lang="es-PY"/>
           </a:p>
@@ -1415,7 +1415,7 @@
           <a:p>
             <a:fld id="{1B191391-6197-4AE5-88CF-40C5D3F13529}" type="datetimeFigureOut">
               <a:rPr lang="es-PY" smtClean="0"/>
-              <a:t>27/4/2023</a:t>
+              <a:t>2/5/2023</a:t>
             </a:fld>
             <a:endParaRPr lang="es-PY"/>
           </a:p>
@@ -1830,7 +1830,7 @@
           <a:p>
             <a:fld id="{1B191391-6197-4AE5-88CF-40C5D3F13529}" type="datetimeFigureOut">
               <a:rPr lang="es-PY" smtClean="0"/>
-              <a:t>27/4/2023</a:t>
+              <a:t>2/5/2023</a:t>
             </a:fld>
             <a:endParaRPr lang="es-PY"/>
           </a:p>
@@ -1972,7 +1972,7 @@
           <a:p>
             <a:fld id="{1B191391-6197-4AE5-88CF-40C5D3F13529}" type="datetimeFigureOut">
               <a:rPr lang="es-PY" smtClean="0"/>
-              <a:t>27/4/2023</a:t>
+              <a:t>2/5/2023</a:t>
             </a:fld>
             <a:endParaRPr lang="es-PY"/>
           </a:p>
@@ -2085,7 +2085,7 @@
           <a:p>
             <a:fld id="{1B191391-6197-4AE5-88CF-40C5D3F13529}" type="datetimeFigureOut">
               <a:rPr lang="es-PY" smtClean="0"/>
-              <a:t>27/4/2023</a:t>
+              <a:t>2/5/2023</a:t>
             </a:fld>
             <a:endParaRPr lang="es-PY"/>
           </a:p>
@@ -2398,7 +2398,7 @@
           <a:p>
             <a:fld id="{1B191391-6197-4AE5-88CF-40C5D3F13529}" type="datetimeFigureOut">
               <a:rPr lang="es-PY" smtClean="0"/>
-              <a:t>27/4/2023</a:t>
+              <a:t>2/5/2023</a:t>
             </a:fld>
             <a:endParaRPr lang="es-PY"/>
           </a:p>
@@ -2687,7 +2687,7 @@
           <a:p>
             <a:fld id="{1B191391-6197-4AE5-88CF-40C5D3F13529}" type="datetimeFigureOut">
               <a:rPr lang="es-PY" smtClean="0"/>
-              <a:t>27/4/2023</a:t>
+              <a:t>2/5/2023</a:t>
             </a:fld>
             <a:endParaRPr lang="es-PY"/>
           </a:p>
@@ -2930,7 +2930,7 @@
           <a:p>
             <a:fld id="{1B191391-6197-4AE5-88CF-40C5D3F13529}" type="datetimeFigureOut">
               <a:rPr lang="es-PY" smtClean="0"/>
-              <a:t>27/4/2023</a:t>
+              <a:t>2/5/2023</a:t>
             </a:fld>
             <a:endParaRPr lang="es-PY"/>
           </a:p>
@@ -4029,7 +4029,7 @@
               <a:p>
                 <a:pPr algn="ctr"/>
                 <a:r>
-                  <a:rPr lang="en-US"/>
+                  <a:rPr lang="en-US" dirty="0"/>
                   <a:t> </a:t>
                 </a:r>
               </a:p>
@@ -5515,7 +5515,7 @@
                 <a:ea typeface="Open Sans" panose="020B0606030504020204" pitchFamily="34" charset="0"/>
                 <a:cs typeface="Open Sans" panose="020B0606030504020204" pitchFamily="34" charset="0"/>
               </a:rPr>
-              <a:t>Obteniendo los productos con mayores subas de precios tenemos los siguientes resultados:</a:t>
+              <a:t>Obteniendo 3 los productos con mayores subas de precios tenemos los siguientes resultados:</a:t>
             </a:r>
             <a:endParaRPr lang="en-US" sz="950" dirty="0">
               <a:latin typeface="Montserrat Light" panose="00000400000000000000" pitchFamily="50" charset="0"/>
@@ -6416,6 +6416,192 @@
           </a:prstGeom>
         </p:spPr>
       </p:pic>
+      <p:sp>
+        <p:nvSpPr>
+          <p:cNvPr id="2" name="TextBox 19">
+            <a:extLst>
+              <a:ext uri="{FF2B5EF4-FFF2-40B4-BE49-F238E27FC236}">
+                <a16:creationId xmlns:a16="http://schemas.microsoft.com/office/drawing/2014/main" id="{C8B69009-A1E4-93E0-30CA-D5983D9EAC25}"/>
+              </a:ext>
+            </a:extLst>
+          </p:cNvPr>
+          <p:cNvSpPr txBox="1">
+            <a:spLocks noChangeArrowheads="1"/>
+          </p:cNvSpPr>
+          <p:nvPr/>
+        </p:nvSpPr>
+        <p:spPr bwMode="auto">
+          <a:xfrm>
+            <a:off x="9512147" y="2581095"/>
+            <a:ext cx="2597938" cy="1992831"/>
+          </a:xfrm>
+          <a:prstGeom prst="rect">
+            <a:avLst/>
+          </a:prstGeom>
+          <a:noFill/>
+          <a:ln>
+            <a:noFill/>
+          </a:ln>
+          <a:extLst>
+            <a:ext uri="{909E8E84-426E-40DD-AFC4-6F175D3DCCD1}">
+              <a14:hiddenFill xmlns:a14="http://schemas.microsoft.com/office/drawing/2010/main">
+                <a:solidFill>
+                  <a:srgbClr val="FFFFFF"/>
+                </a:solidFill>
+              </a14:hiddenFill>
+            </a:ext>
+            <a:ext uri="{91240B29-F687-4F45-9708-019B960494DF}">
+              <a14:hiddenLine xmlns:a14="http://schemas.microsoft.com/office/drawing/2010/main" w="9525">
+                <a:solidFill>
+                  <a:srgbClr val="000000"/>
+                </a:solidFill>
+                <a:miter lim="800000"/>
+                <a:headEnd/>
+                <a:tailEnd/>
+              </a14:hiddenLine>
+            </a:ext>
+          </a:extLst>
+        </p:spPr>
+        <p:txBody>
+          <a:bodyPr wrap="square" lIns="91418" tIns="45709" rIns="91418" bIns="45709">
+            <a:spAutoFit/>
+          </a:bodyPr>
+          <a:lstStyle>
+            <a:defPPr>
+              <a:defRPr kern="1200"/>
+            </a:defPPr>
+            <a:lvl1pPr eaLnBrk="0" hangingPunct="0">
+              <a:defRPr sz="2000">
+                <a:solidFill>
+                  <a:schemeClr val="tx1"/>
+                </a:solidFill>
+                <a:latin typeface="Arial"/>
+                <a:ea typeface="ＭＳ Ｐゴシック" pitchFamily="-106" charset="-128"/>
+              </a:defRPr>
+            </a:lvl1pPr>
+            <a:lvl2pPr eaLnBrk="0" hangingPunct="0">
+              <a:defRPr sz="2000">
+                <a:solidFill>
+                  <a:schemeClr val="tx1"/>
+                </a:solidFill>
+                <a:latin typeface="Arial"/>
+                <a:ea typeface="ＭＳ Ｐゴシック" pitchFamily="-106" charset="-128"/>
+              </a:defRPr>
+            </a:lvl2pPr>
+            <a:lvl3pPr marL="1143000" indent="-228600" eaLnBrk="0" hangingPunct="0">
+              <a:defRPr sz="2000">
+                <a:solidFill>
+                  <a:schemeClr val="tx1"/>
+                </a:solidFill>
+                <a:latin typeface="Arial"/>
+                <a:ea typeface="ＭＳ Ｐゴシック" pitchFamily="-106" charset="-128"/>
+              </a:defRPr>
+            </a:lvl3pPr>
+            <a:lvl4pPr marL="1600200" indent="-228600" eaLnBrk="0" hangingPunct="0">
+              <a:defRPr sz="2000">
+                <a:solidFill>
+                  <a:schemeClr val="tx1"/>
+                </a:solidFill>
+                <a:latin typeface="Arial"/>
+                <a:ea typeface="ＭＳ Ｐゴシック" pitchFamily="-106" charset="-128"/>
+              </a:defRPr>
+            </a:lvl4pPr>
+            <a:lvl5pPr marL="2057400" indent="-228600" eaLnBrk="0" hangingPunct="0">
+              <a:defRPr sz="2000">
+                <a:solidFill>
+                  <a:schemeClr val="tx1"/>
+                </a:solidFill>
+                <a:latin typeface="Arial"/>
+                <a:ea typeface="ＭＳ Ｐゴシック" pitchFamily="-106" charset="-128"/>
+              </a:defRPr>
+            </a:lvl5pPr>
+            <a:lvl6pPr marL="2514600" indent="-228600" eaLnBrk="0" fontAlgn="base" hangingPunct="0">
+              <a:spcBef>
+                <a:spcPct val="0"/>
+              </a:spcBef>
+              <a:spcAft>
+                <a:spcPct val="0"/>
+              </a:spcAft>
+              <a:defRPr sz="2000">
+                <a:solidFill>
+                  <a:schemeClr val="tx1"/>
+                </a:solidFill>
+                <a:latin typeface="Arial"/>
+                <a:ea typeface="ＭＳ Ｐゴシック" pitchFamily="-106" charset="-128"/>
+              </a:defRPr>
+            </a:lvl6pPr>
+            <a:lvl7pPr marL="2971800" indent="-228600" eaLnBrk="0" fontAlgn="base" hangingPunct="0">
+              <a:spcBef>
+                <a:spcPct val="0"/>
+              </a:spcBef>
+              <a:spcAft>
+                <a:spcPct val="0"/>
+              </a:spcAft>
+              <a:defRPr sz="2000">
+                <a:solidFill>
+                  <a:schemeClr val="tx1"/>
+                </a:solidFill>
+                <a:latin typeface="Arial"/>
+                <a:ea typeface="ＭＳ Ｐゴシック" pitchFamily="-106" charset="-128"/>
+              </a:defRPr>
+            </a:lvl7pPr>
+            <a:lvl8pPr marL="3429000" indent="-228600" eaLnBrk="0" fontAlgn="base" hangingPunct="0">
+              <a:spcBef>
+                <a:spcPct val="0"/>
+              </a:spcBef>
+              <a:spcAft>
+                <a:spcPct val="0"/>
+              </a:spcAft>
+              <a:defRPr sz="2000">
+                <a:solidFill>
+                  <a:schemeClr val="tx1"/>
+                </a:solidFill>
+                <a:latin typeface="Arial"/>
+                <a:ea typeface="ＭＳ Ｐゴシック" pitchFamily="-106" charset="-128"/>
+              </a:defRPr>
+            </a:lvl8pPr>
+            <a:lvl9pPr marL="3886200" indent="-228600" eaLnBrk="0" fontAlgn="base" hangingPunct="0">
+              <a:spcBef>
+                <a:spcPct val="0"/>
+              </a:spcBef>
+              <a:spcAft>
+                <a:spcPct val="0"/>
+              </a:spcAft>
+              <a:defRPr sz="2000">
+                <a:solidFill>
+                  <a:schemeClr val="tx1"/>
+                </a:solidFill>
+                <a:latin typeface="Arial"/>
+                <a:ea typeface="ＭＳ Ｐゴシック" pitchFamily="-106" charset="-128"/>
+              </a:defRPr>
+            </a:lvl9pPr>
+          </a:lstStyle>
+          <a:p>
+            <a:pPr algn="just"/>
+            <a:r>
+              <a:rPr lang="es-ES" sz="950" dirty="0">
+                <a:latin typeface="Montserrat Light" panose="00000400000000000000" pitchFamily="50" charset="0"/>
+                <a:ea typeface="Open Sans" panose="020B0606030504020204" pitchFamily="34" charset="0"/>
+                <a:cs typeface="Open Sans" panose="020B0606030504020204" pitchFamily="34" charset="0"/>
+              </a:rPr>
+              <a:t>Entre los años 2015 y 2019 los precios de productos tuvieron un incremento máximo del 35,5 %, sin embargo comparando los precios entre los años 2019 y 2022 vemos que más de la mitad de los productos sobrepasa ese porcentaje de en este periodo de 4 años lo que representa que más de la mitad de los productos superan al pico máximo del periodo anterior, en un periodo donde la pandemia fue la desencadenante de varias crisis económicas </a:t>
+            </a:r>
+            <a:r>
+              <a:rPr lang="es-ES" sz="950">
+                <a:latin typeface="Montserrat Light" panose="00000400000000000000" pitchFamily="50" charset="0"/>
+                <a:ea typeface="Open Sans" panose="020B0606030504020204" pitchFamily="34" charset="0"/>
+                <a:cs typeface="Open Sans" panose="020B0606030504020204" pitchFamily="34" charset="0"/>
+              </a:rPr>
+              <a:t>y sociales.</a:t>
+            </a:r>
+            <a:endParaRPr lang="en-US" sz="950" dirty="0">
+              <a:latin typeface="Montserrat Light" panose="00000400000000000000" pitchFamily="50" charset="0"/>
+              <a:ea typeface="Open Sans" panose="020B0606030504020204" pitchFamily="34" charset="0"/>
+              <a:cs typeface="Open Sans" panose="020B0606030504020204" pitchFamily="34" charset="0"/>
+            </a:endParaRPr>
+          </a:p>
+        </p:txBody>
+      </p:sp>
     </p:spTree>
     <p:extLst>
       <p:ext uri="{BB962C8B-B14F-4D97-AF65-F5344CB8AC3E}">

</xml_diff>

<commit_message>
Nuevo gráfico de ranking de productos con subas
</commit_message>
<xml_diff>
--- a/Poster.pptx
+++ b/Poster.pptx
@@ -261,7 +261,7 @@
           <a:p>
             <a:fld id="{1B191391-6197-4AE5-88CF-40C5D3F13529}" type="datetimeFigureOut">
               <a:rPr lang="es-PY" smtClean="0"/>
-              <a:t>2/5/2023</a:t>
+              <a:t>9/5/2023</a:t>
             </a:fld>
             <a:endParaRPr lang="es-PY"/>
           </a:p>
@@ -461,7 +461,7 @@
           <a:p>
             <a:fld id="{1B191391-6197-4AE5-88CF-40C5D3F13529}" type="datetimeFigureOut">
               <a:rPr lang="es-PY" smtClean="0"/>
-              <a:t>2/5/2023</a:t>
+              <a:t>9/5/2023</a:t>
             </a:fld>
             <a:endParaRPr lang="es-PY"/>
           </a:p>
@@ -671,7 +671,7 @@
           <a:p>
             <a:fld id="{1B191391-6197-4AE5-88CF-40C5D3F13529}" type="datetimeFigureOut">
               <a:rPr lang="es-PY" smtClean="0"/>
-              <a:t>2/5/2023</a:t>
+              <a:t>9/5/2023</a:t>
             </a:fld>
             <a:endParaRPr lang="es-PY"/>
           </a:p>
@@ -871,7 +871,7 @@
           <a:p>
             <a:fld id="{1B191391-6197-4AE5-88CF-40C5D3F13529}" type="datetimeFigureOut">
               <a:rPr lang="es-PY" smtClean="0"/>
-              <a:t>2/5/2023</a:t>
+              <a:t>9/5/2023</a:t>
             </a:fld>
             <a:endParaRPr lang="es-PY"/>
           </a:p>
@@ -1147,7 +1147,7 @@
           <a:p>
             <a:fld id="{1B191391-6197-4AE5-88CF-40C5D3F13529}" type="datetimeFigureOut">
               <a:rPr lang="es-PY" smtClean="0"/>
-              <a:t>2/5/2023</a:t>
+              <a:t>9/5/2023</a:t>
             </a:fld>
             <a:endParaRPr lang="es-PY"/>
           </a:p>
@@ -1415,7 +1415,7 @@
           <a:p>
             <a:fld id="{1B191391-6197-4AE5-88CF-40C5D3F13529}" type="datetimeFigureOut">
               <a:rPr lang="es-PY" smtClean="0"/>
-              <a:t>2/5/2023</a:t>
+              <a:t>9/5/2023</a:t>
             </a:fld>
             <a:endParaRPr lang="es-PY"/>
           </a:p>
@@ -1830,7 +1830,7 @@
           <a:p>
             <a:fld id="{1B191391-6197-4AE5-88CF-40C5D3F13529}" type="datetimeFigureOut">
               <a:rPr lang="es-PY" smtClean="0"/>
-              <a:t>2/5/2023</a:t>
+              <a:t>9/5/2023</a:t>
             </a:fld>
             <a:endParaRPr lang="es-PY"/>
           </a:p>
@@ -1972,7 +1972,7 @@
           <a:p>
             <a:fld id="{1B191391-6197-4AE5-88CF-40C5D3F13529}" type="datetimeFigureOut">
               <a:rPr lang="es-PY" smtClean="0"/>
-              <a:t>2/5/2023</a:t>
+              <a:t>9/5/2023</a:t>
             </a:fld>
             <a:endParaRPr lang="es-PY"/>
           </a:p>
@@ -2085,7 +2085,7 @@
           <a:p>
             <a:fld id="{1B191391-6197-4AE5-88CF-40C5D3F13529}" type="datetimeFigureOut">
               <a:rPr lang="es-PY" smtClean="0"/>
-              <a:t>2/5/2023</a:t>
+              <a:t>9/5/2023</a:t>
             </a:fld>
             <a:endParaRPr lang="es-PY"/>
           </a:p>
@@ -2398,7 +2398,7 @@
           <a:p>
             <a:fld id="{1B191391-6197-4AE5-88CF-40C5D3F13529}" type="datetimeFigureOut">
               <a:rPr lang="es-PY" smtClean="0"/>
-              <a:t>2/5/2023</a:t>
+              <a:t>9/5/2023</a:t>
             </a:fld>
             <a:endParaRPr lang="es-PY"/>
           </a:p>
@@ -2687,7 +2687,7 @@
           <a:p>
             <a:fld id="{1B191391-6197-4AE5-88CF-40C5D3F13529}" type="datetimeFigureOut">
               <a:rPr lang="es-PY" smtClean="0"/>
-              <a:t>2/5/2023</a:t>
+              <a:t>9/5/2023</a:t>
             </a:fld>
             <a:endParaRPr lang="es-PY"/>
           </a:p>
@@ -2930,7 +2930,7 @@
           <a:p>
             <a:fld id="{1B191391-6197-4AE5-88CF-40C5D3F13529}" type="datetimeFigureOut">
               <a:rPr lang="es-PY" smtClean="0"/>
-              <a:t>2/5/2023</a:t>
+              <a:t>9/5/2023</a:t>
             </a:fld>
             <a:endParaRPr lang="es-PY"/>
           </a:p>
@@ -6386,36 +6386,6 @@
           </a:p>
         </p:txBody>
       </p:sp>
-      <p:pic>
-        <p:nvPicPr>
-          <p:cNvPr id="3" name="Imagen 2">
-            <a:extLst>
-              <a:ext uri="{FF2B5EF4-FFF2-40B4-BE49-F238E27FC236}">
-                <a16:creationId xmlns:a16="http://schemas.microsoft.com/office/drawing/2014/main" id="{1172FA30-3FAB-0F82-8CB1-F8158D85BAE5}"/>
-              </a:ext>
-            </a:extLst>
-          </p:cNvPr>
-          <p:cNvPicPr>
-            <a:picLocks noChangeAspect="1"/>
-          </p:cNvPicPr>
-          <p:nvPr/>
-        </p:nvPicPr>
-        <p:blipFill>
-          <a:blip r:embed="rId6"/>
-          <a:stretch>
-            <a:fillRect/>
-          </a:stretch>
-        </p:blipFill>
-        <p:spPr>
-          <a:xfrm>
-            <a:off x="2829488" y="3854568"/>
-            <a:ext cx="6463617" cy="589048"/>
-          </a:xfrm>
-          <a:prstGeom prst="rect">
-            <a:avLst/>
-          </a:prstGeom>
-        </p:spPr>
-      </p:pic>
       <p:sp>
         <p:nvSpPr>
           <p:cNvPr id="2" name="TextBox 19">
@@ -6602,6 +6572,36 @@
           </a:p>
         </p:txBody>
       </p:sp>
+      <p:pic>
+        <p:nvPicPr>
+          <p:cNvPr id="15" name="Imagen 14">
+            <a:extLst>
+              <a:ext uri="{FF2B5EF4-FFF2-40B4-BE49-F238E27FC236}">
+                <a16:creationId xmlns:a16="http://schemas.microsoft.com/office/drawing/2014/main" id="{AE92F3A7-79E6-BDDB-B6BF-51480DB46CEE}"/>
+              </a:ext>
+            </a:extLst>
+          </p:cNvPr>
+          <p:cNvPicPr>
+            <a:picLocks noChangeAspect="1"/>
+          </p:cNvPicPr>
+          <p:nvPr/>
+        </p:nvPicPr>
+        <p:blipFill>
+          <a:blip r:embed="rId6"/>
+          <a:stretch>
+            <a:fillRect/>
+          </a:stretch>
+        </p:blipFill>
+        <p:spPr>
+          <a:xfrm>
+            <a:off x="2898761" y="3818910"/>
+            <a:ext cx="6368184" cy="594074"/>
+          </a:xfrm>
+          <a:prstGeom prst="rect">
+            <a:avLst/>
+          </a:prstGeom>
+        </p:spPr>
+      </p:pic>
     </p:spTree>
     <p:extLst>
       <p:ext uri="{BB962C8B-B14F-4D97-AF65-F5344CB8AC3E}">

</xml_diff>

<commit_message>
Actualización en la conclusión
Durante el periodo de 2015 a 2019, los precios de los productos de la canasta familiar experimentaron un aumento máximo del 35.5%. Sin embargo, al comparar los precios entre 2019 y 2022, se evidencia que más del 50% de los productos superan este porcentaje, destacando el aceite de soja con un incremento del 143.26%, seguido de la mandioca con un aumento del 111.46%, y la banana karape con un incremento del 71.43%. Estas cifras reflejan la preocupante variación de precios experimentada durante este periodo, agravada por la crisis económica y social derivada de la pandemia del COVID-19
</commit_message>
<xml_diff>
--- a/Poster.pptx
+++ b/Poster.pptx
@@ -261,7 +261,7 @@
           <a:p>
             <a:fld id="{1B191391-6197-4AE5-88CF-40C5D3F13529}" type="datetimeFigureOut">
               <a:rPr lang="es-PY" smtClean="0"/>
-              <a:t>9/5/2023</a:t>
+              <a:t>10/5/2023</a:t>
             </a:fld>
             <a:endParaRPr lang="es-PY"/>
           </a:p>
@@ -461,7 +461,7 @@
           <a:p>
             <a:fld id="{1B191391-6197-4AE5-88CF-40C5D3F13529}" type="datetimeFigureOut">
               <a:rPr lang="es-PY" smtClean="0"/>
-              <a:t>9/5/2023</a:t>
+              <a:t>10/5/2023</a:t>
             </a:fld>
             <a:endParaRPr lang="es-PY"/>
           </a:p>
@@ -671,7 +671,7 @@
           <a:p>
             <a:fld id="{1B191391-6197-4AE5-88CF-40C5D3F13529}" type="datetimeFigureOut">
               <a:rPr lang="es-PY" smtClean="0"/>
-              <a:t>9/5/2023</a:t>
+              <a:t>10/5/2023</a:t>
             </a:fld>
             <a:endParaRPr lang="es-PY"/>
           </a:p>
@@ -871,7 +871,7 @@
           <a:p>
             <a:fld id="{1B191391-6197-4AE5-88CF-40C5D3F13529}" type="datetimeFigureOut">
               <a:rPr lang="es-PY" smtClean="0"/>
-              <a:t>9/5/2023</a:t>
+              <a:t>10/5/2023</a:t>
             </a:fld>
             <a:endParaRPr lang="es-PY"/>
           </a:p>
@@ -1147,7 +1147,7 @@
           <a:p>
             <a:fld id="{1B191391-6197-4AE5-88CF-40C5D3F13529}" type="datetimeFigureOut">
               <a:rPr lang="es-PY" smtClean="0"/>
-              <a:t>9/5/2023</a:t>
+              <a:t>10/5/2023</a:t>
             </a:fld>
             <a:endParaRPr lang="es-PY"/>
           </a:p>
@@ -1415,7 +1415,7 @@
           <a:p>
             <a:fld id="{1B191391-6197-4AE5-88CF-40C5D3F13529}" type="datetimeFigureOut">
               <a:rPr lang="es-PY" smtClean="0"/>
-              <a:t>9/5/2023</a:t>
+              <a:t>10/5/2023</a:t>
             </a:fld>
             <a:endParaRPr lang="es-PY"/>
           </a:p>
@@ -1830,7 +1830,7 @@
           <a:p>
             <a:fld id="{1B191391-6197-4AE5-88CF-40C5D3F13529}" type="datetimeFigureOut">
               <a:rPr lang="es-PY" smtClean="0"/>
-              <a:t>9/5/2023</a:t>
+              <a:t>10/5/2023</a:t>
             </a:fld>
             <a:endParaRPr lang="es-PY"/>
           </a:p>
@@ -1972,7 +1972,7 @@
           <a:p>
             <a:fld id="{1B191391-6197-4AE5-88CF-40C5D3F13529}" type="datetimeFigureOut">
               <a:rPr lang="es-PY" smtClean="0"/>
-              <a:t>9/5/2023</a:t>
+              <a:t>10/5/2023</a:t>
             </a:fld>
             <a:endParaRPr lang="es-PY"/>
           </a:p>
@@ -2085,7 +2085,7 @@
           <a:p>
             <a:fld id="{1B191391-6197-4AE5-88CF-40C5D3F13529}" type="datetimeFigureOut">
               <a:rPr lang="es-PY" smtClean="0"/>
-              <a:t>9/5/2023</a:t>
+              <a:t>10/5/2023</a:t>
             </a:fld>
             <a:endParaRPr lang="es-PY"/>
           </a:p>
@@ -2398,7 +2398,7 @@
           <a:p>
             <a:fld id="{1B191391-6197-4AE5-88CF-40C5D3F13529}" type="datetimeFigureOut">
               <a:rPr lang="es-PY" smtClean="0"/>
-              <a:t>9/5/2023</a:t>
+              <a:t>10/5/2023</a:t>
             </a:fld>
             <a:endParaRPr lang="es-PY"/>
           </a:p>
@@ -2687,7 +2687,7 @@
           <a:p>
             <a:fld id="{1B191391-6197-4AE5-88CF-40C5D3F13529}" type="datetimeFigureOut">
               <a:rPr lang="es-PY" smtClean="0"/>
-              <a:t>9/5/2023</a:t>
+              <a:t>10/5/2023</a:t>
             </a:fld>
             <a:endParaRPr lang="es-PY"/>
           </a:p>
@@ -2930,7 +2930,7 @@
           <a:p>
             <a:fld id="{1B191391-6197-4AE5-88CF-40C5D3F13529}" type="datetimeFigureOut">
               <a:rPr lang="es-PY" smtClean="0"/>
-              <a:t>9/5/2023</a:t>
+              <a:t>10/5/2023</a:t>
             </a:fld>
             <a:endParaRPr lang="es-PY"/>
           </a:p>
@@ -5050,7 +5050,7 @@
         </p:nvSpPr>
         <p:spPr bwMode="auto">
           <a:xfrm>
-            <a:off x="9512147" y="2221462"/>
+            <a:off x="9512147" y="2094137"/>
             <a:ext cx="2631705" cy="327191"/>
           </a:xfrm>
           <a:prstGeom prst="rect">
@@ -6402,8 +6402,8 @@
         </p:nvSpPr>
         <p:spPr bwMode="auto">
           <a:xfrm>
-            <a:off x="9512147" y="2581095"/>
-            <a:ext cx="2597938" cy="1992831"/>
+            <a:off x="9512147" y="2453770"/>
+            <a:ext cx="2597938" cy="2431413"/>
           </a:xfrm>
           <a:prstGeom prst="rect">
             <a:avLst/>
@@ -6554,15 +6554,23 @@
                 <a:ea typeface="Open Sans" panose="020B0606030504020204" pitchFamily="34" charset="0"/>
                 <a:cs typeface="Open Sans" panose="020B0606030504020204" pitchFamily="34" charset="0"/>
               </a:rPr>
-              <a:t>Entre los años 2015 y 2019 los precios de productos tuvieron un incremento máximo del 35,5 %, sin embargo comparando los precios entre los años 2019 y 2022 vemos que más de la mitad de los productos sobrepasa ese porcentaje de en este periodo de 4 años lo que representa que más de la mitad de los productos superan al pico máximo del periodo anterior, en un periodo donde la pandemia fue la desencadenante de varias crisis económicas </a:t>
-            </a:r>
-            <a:r>
-              <a:rPr lang="es-ES" sz="950">
+              <a:t>Durante el periodo de 2015 a 2019, los precios de los productos de la canasta familiar experimentaron un aumento máximo del 35.5%. Sin embargo, al comparar los precios entre 2019 y 2022, se evidencia que más del 50% de los productos superan este porcentaje, destacando el aceite de soja con un incremento del 143.26%, seguido de la mandioca con un aumento del 111.46%, y la banana </a:t>
+            </a:r>
+            <a:r>
+              <a:rPr lang="es-ES" sz="950" dirty="0" err="1">
                 <a:latin typeface="Montserrat Light" panose="00000400000000000000" pitchFamily="50" charset="0"/>
                 <a:ea typeface="Open Sans" panose="020B0606030504020204" pitchFamily="34" charset="0"/>
                 <a:cs typeface="Open Sans" panose="020B0606030504020204" pitchFamily="34" charset="0"/>
               </a:rPr>
-              <a:t>y sociales.</a:t>
+              <a:t>karape</a:t>
+            </a:r>
+            <a:r>
+              <a:rPr lang="es-ES" sz="950" dirty="0">
+                <a:latin typeface="Montserrat Light" panose="00000400000000000000" pitchFamily="50" charset="0"/>
+                <a:ea typeface="Open Sans" panose="020B0606030504020204" pitchFamily="34" charset="0"/>
+                <a:cs typeface="Open Sans" panose="020B0606030504020204" pitchFamily="34" charset="0"/>
+              </a:rPr>
+              <a:t> con un incremento del 71.43%. Estas cifras reflejan la preocupante variación de precios experimentada durante este periodo, agravada por la crisis económica y social derivada de la pandemia del COVID-19.</a:t>
             </a:r>
             <a:endParaRPr lang="en-US" sz="950" dirty="0">
               <a:latin typeface="Montserrat Light" panose="00000400000000000000" pitchFamily="50" charset="0"/>

</xml_diff>